<commit_message>
Changed launcher icon (for testing purposes)
</commit_message>
<xml_diff>
--- a/app/icon.pptx
+++ b/app/icon.pptx
@@ -9,7 +9,8 @@
     <p:sldId id="257" r:id="rId3"/>
     <p:sldId id="258" r:id="rId4"/>
     <p:sldId id="259" r:id="rId5"/>
-    <p:sldId id="260" r:id="rId6"/>
+    <p:sldId id="261" r:id="rId6"/>
+    <p:sldId id="260" r:id="rId7"/>
   </p:sldIdLst>
   <p:sldSz cx="12192000" cy="6858000"/>
   <p:notesSz cx="6858000" cy="9144000"/>
@@ -263,7 +264,7 @@
           <a:p>
             <a:fld id="{FD5DF3F8-9F13-4D99-A917-03071D1283BB}" type="datetimeFigureOut">
               <a:rPr lang="fr-FR" smtClean="0"/>
-              <a:t>11/07/2021</a:t>
+              <a:t>10/03/2022</a:t>
             </a:fld>
             <a:endParaRPr lang="fr-FR"/>
           </a:p>
@@ -317,7 +318,7 @@
           <a:p>
             <a:fld id="{FECB8FDB-ACC7-4353-9F09-CC7366EFBC21}" type="slidenum">
               <a:rPr lang="fr-FR" smtClean="0"/>
-              <a:t>‹N°›</a:t>
+              <a:t>‹#›</a:t>
             </a:fld>
             <a:endParaRPr lang="fr-FR"/>
           </a:p>
@@ -461,7 +462,7 @@
           <a:p>
             <a:fld id="{FD5DF3F8-9F13-4D99-A917-03071D1283BB}" type="datetimeFigureOut">
               <a:rPr lang="fr-FR" smtClean="0"/>
-              <a:t>11/07/2021</a:t>
+              <a:t>10/03/2022</a:t>
             </a:fld>
             <a:endParaRPr lang="fr-FR"/>
           </a:p>
@@ -515,7 +516,7 @@
           <a:p>
             <a:fld id="{FECB8FDB-ACC7-4353-9F09-CC7366EFBC21}" type="slidenum">
               <a:rPr lang="fr-FR" smtClean="0"/>
-              <a:t>‹N°›</a:t>
+              <a:t>‹#›</a:t>
             </a:fld>
             <a:endParaRPr lang="fr-FR"/>
           </a:p>
@@ -669,7 +670,7 @@
           <a:p>
             <a:fld id="{FD5DF3F8-9F13-4D99-A917-03071D1283BB}" type="datetimeFigureOut">
               <a:rPr lang="fr-FR" smtClean="0"/>
-              <a:t>11/07/2021</a:t>
+              <a:t>10/03/2022</a:t>
             </a:fld>
             <a:endParaRPr lang="fr-FR"/>
           </a:p>
@@ -723,7 +724,7 @@
           <a:p>
             <a:fld id="{FECB8FDB-ACC7-4353-9F09-CC7366EFBC21}" type="slidenum">
               <a:rPr lang="fr-FR" smtClean="0"/>
-              <a:t>‹N°›</a:t>
+              <a:t>‹#›</a:t>
             </a:fld>
             <a:endParaRPr lang="fr-FR"/>
           </a:p>
@@ -867,7 +868,7 @@
           <a:p>
             <a:fld id="{FD5DF3F8-9F13-4D99-A917-03071D1283BB}" type="datetimeFigureOut">
               <a:rPr lang="fr-FR" smtClean="0"/>
-              <a:t>11/07/2021</a:t>
+              <a:t>10/03/2022</a:t>
             </a:fld>
             <a:endParaRPr lang="fr-FR"/>
           </a:p>
@@ -921,7 +922,7 @@
           <a:p>
             <a:fld id="{FECB8FDB-ACC7-4353-9F09-CC7366EFBC21}" type="slidenum">
               <a:rPr lang="fr-FR" smtClean="0"/>
-              <a:t>‹N°›</a:t>
+              <a:t>‹#›</a:t>
             </a:fld>
             <a:endParaRPr lang="fr-FR"/>
           </a:p>
@@ -1142,7 +1143,7 @@
           <a:p>
             <a:fld id="{FD5DF3F8-9F13-4D99-A917-03071D1283BB}" type="datetimeFigureOut">
               <a:rPr lang="fr-FR" smtClean="0"/>
-              <a:t>11/07/2021</a:t>
+              <a:t>10/03/2022</a:t>
             </a:fld>
             <a:endParaRPr lang="fr-FR"/>
           </a:p>
@@ -1196,7 +1197,7 @@
           <a:p>
             <a:fld id="{FECB8FDB-ACC7-4353-9F09-CC7366EFBC21}" type="slidenum">
               <a:rPr lang="fr-FR" smtClean="0"/>
-              <a:t>‹N°›</a:t>
+              <a:t>‹#›</a:t>
             </a:fld>
             <a:endParaRPr lang="fr-FR"/>
           </a:p>
@@ -1407,7 +1408,7 @@
           <a:p>
             <a:fld id="{FD5DF3F8-9F13-4D99-A917-03071D1283BB}" type="datetimeFigureOut">
               <a:rPr lang="fr-FR" smtClean="0"/>
-              <a:t>11/07/2021</a:t>
+              <a:t>10/03/2022</a:t>
             </a:fld>
             <a:endParaRPr lang="fr-FR"/>
           </a:p>
@@ -1461,7 +1462,7 @@
           <a:p>
             <a:fld id="{FECB8FDB-ACC7-4353-9F09-CC7366EFBC21}" type="slidenum">
               <a:rPr lang="fr-FR" smtClean="0"/>
-              <a:t>‹N°›</a:t>
+              <a:t>‹#›</a:t>
             </a:fld>
             <a:endParaRPr lang="fr-FR"/>
           </a:p>
@@ -1819,7 +1820,7 @@
           <a:p>
             <a:fld id="{FD5DF3F8-9F13-4D99-A917-03071D1283BB}" type="datetimeFigureOut">
               <a:rPr lang="fr-FR" smtClean="0"/>
-              <a:t>11/07/2021</a:t>
+              <a:t>10/03/2022</a:t>
             </a:fld>
             <a:endParaRPr lang="fr-FR"/>
           </a:p>
@@ -1873,7 +1874,7 @@
           <a:p>
             <a:fld id="{FECB8FDB-ACC7-4353-9F09-CC7366EFBC21}" type="slidenum">
               <a:rPr lang="fr-FR" smtClean="0"/>
-              <a:t>‹N°›</a:t>
+              <a:t>‹#›</a:t>
             </a:fld>
             <a:endParaRPr lang="fr-FR"/>
           </a:p>
@@ -1960,7 +1961,7 @@
           <a:p>
             <a:fld id="{FD5DF3F8-9F13-4D99-A917-03071D1283BB}" type="datetimeFigureOut">
               <a:rPr lang="fr-FR" smtClean="0"/>
-              <a:t>11/07/2021</a:t>
+              <a:t>10/03/2022</a:t>
             </a:fld>
             <a:endParaRPr lang="fr-FR"/>
           </a:p>
@@ -2014,7 +2015,7 @@
           <a:p>
             <a:fld id="{FECB8FDB-ACC7-4353-9F09-CC7366EFBC21}" type="slidenum">
               <a:rPr lang="fr-FR" smtClean="0"/>
-              <a:t>‹N°›</a:t>
+              <a:t>‹#›</a:t>
             </a:fld>
             <a:endParaRPr lang="fr-FR"/>
           </a:p>
@@ -2073,7 +2074,7 @@
           <a:p>
             <a:fld id="{FD5DF3F8-9F13-4D99-A917-03071D1283BB}" type="datetimeFigureOut">
               <a:rPr lang="fr-FR" smtClean="0"/>
-              <a:t>11/07/2021</a:t>
+              <a:t>10/03/2022</a:t>
             </a:fld>
             <a:endParaRPr lang="fr-FR"/>
           </a:p>
@@ -2127,7 +2128,7 @@
           <a:p>
             <a:fld id="{FECB8FDB-ACC7-4353-9F09-CC7366EFBC21}" type="slidenum">
               <a:rPr lang="fr-FR" smtClean="0"/>
-              <a:t>‹N°›</a:t>
+              <a:t>‹#›</a:t>
             </a:fld>
             <a:endParaRPr lang="fr-FR"/>
           </a:p>
@@ -2384,7 +2385,7 @@
           <a:p>
             <a:fld id="{FD5DF3F8-9F13-4D99-A917-03071D1283BB}" type="datetimeFigureOut">
               <a:rPr lang="fr-FR" smtClean="0"/>
-              <a:t>11/07/2021</a:t>
+              <a:t>10/03/2022</a:t>
             </a:fld>
             <a:endParaRPr lang="fr-FR"/>
           </a:p>
@@ -2438,7 +2439,7 @@
           <a:p>
             <a:fld id="{FECB8FDB-ACC7-4353-9F09-CC7366EFBC21}" type="slidenum">
               <a:rPr lang="fr-FR" smtClean="0"/>
-              <a:t>‹N°›</a:t>
+              <a:t>‹#›</a:t>
             </a:fld>
             <a:endParaRPr lang="fr-FR"/>
           </a:p>
@@ -2672,7 +2673,7 @@
           <a:p>
             <a:fld id="{FD5DF3F8-9F13-4D99-A917-03071D1283BB}" type="datetimeFigureOut">
               <a:rPr lang="fr-FR" smtClean="0"/>
-              <a:t>11/07/2021</a:t>
+              <a:t>10/03/2022</a:t>
             </a:fld>
             <a:endParaRPr lang="fr-FR"/>
           </a:p>
@@ -2726,7 +2727,7 @@
           <a:p>
             <a:fld id="{FECB8FDB-ACC7-4353-9F09-CC7366EFBC21}" type="slidenum">
               <a:rPr lang="fr-FR" smtClean="0"/>
-              <a:t>‹N°›</a:t>
+              <a:t>‹#›</a:t>
             </a:fld>
             <a:endParaRPr lang="fr-FR"/>
           </a:p>
@@ -2913,7 +2914,7 @@
           <a:p>
             <a:fld id="{FD5DF3F8-9F13-4D99-A917-03071D1283BB}" type="datetimeFigureOut">
               <a:rPr lang="fr-FR" smtClean="0"/>
-              <a:t>11/07/2021</a:t>
+              <a:t>10/03/2022</a:t>
             </a:fld>
             <a:endParaRPr lang="fr-FR"/>
           </a:p>
@@ -3003,7 +3004,7 @@
           <a:p>
             <a:fld id="{FECB8FDB-ACC7-4353-9F09-CC7366EFBC21}" type="slidenum">
               <a:rPr lang="fr-FR" smtClean="0"/>
-              <a:t>‹N°›</a:t>
+              <a:t>‹#›</a:t>
             </a:fld>
             <a:endParaRPr lang="fr-FR"/>
           </a:p>
@@ -4283,6 +4284,332 @@
 </file>
 
 <file path=ppt/slides/slide5.xml><?xml version="1.0" encoding="utf-8"?>
+<p:sld xmlns:a="http://schemas.openxmlformats.org/drawingml/2006/main" xmlns:r="http://schemas.openxmlformats.org/officeDocument/2006/relationships" xmlns:p="http://schemas.openxmlformats.org/presentationml/2006/main">
+  <p:cSld>
+    <p:bg>
+      <p:bgPr>
+        <a:solidFill>
+          <a:schemeClr val="bg1"/>
+        </a:solidFill>
+        <a:effectLst/>
+      </p:bgPr>
+    </p:bg>
+    <p:spTree>
+      <p:nvGrpSpPr>
+        <p:cNvPr id="1" name=""/>
+        <p:cNvGrpSpPr/>
+        <p:nvPr/>
+      </p:nvGrpSpPr>
+      <p:grpSpPr>
+        <a:xfrm>
+          <a:off x="0" y="0"/>
+          <a:ext cx="0" cy="0"/>
+          <a:chOff x="0" y="0"/>
+          <a:chExt cx="0" cy="0"/>
+        </a:xfrm>
+      </p:grpSpPr>
+      <p:sp>
+        <p:nvSpPr>
+          <p:cNvPr id="9" name="Rectangle : coins arrondis 8">
+            <a:extLst>
+              <a:ext uri="{FF2B5EF4-FFF2-40B4-BE49-F238E27FC236}">
+                <a16:creationId xmlns:a16="http://schemas.microsoft.com/office/drawing/2014/main" id="{81497403-5EFD-4B6C-9259-B9E09E861D3B}"/>
+              </a:ext>
+            </a:extLst>
+          </p:cNvPr>
+          <p:cNvSpPr/>
+          <p:nvPr/>
+        </p:nvSpPr>
+        <p:spPr>
+          <a:xfrm>
+            <a:off x="4423079" y="1756079"/>
+            <a:ext cx="3345840" cy="3345840"/>
+          </a:xfrm>
+          <a:prstGeom prst="roundRect">
+            <a:avLst>
+              <a:gd name="adj" fmla="val 50000"/>
+            </a:avLst>
+          </a:prstGeom>
+          <a:solidFill>
+            <a:schemeClr val="bg1"/>
+          </a:solidFill>
+          <a:ln>
+            <a:noFill/>
+          </a:ln>
+        </p:spPr>
+        <p:style>
+          <a:lnRef idx="2">
+            <a:schemeClr val="accent1">
+              <a:shade val="50000"/>
+            </a:schemeClr>
+          </a:lnRef>
+          <a:fillRef idx="1">
+            <a:schemeClr val="accent1"/>
+          </a:fillRef>
+          <a:effectRef idx="0">
+            <a:schemeClr val="accent1"/>
+          </a:effectRef>
+          <a:fontRef idx="minor">
+            <a:schemeClr val="lt1"/>
+          </a:fontRef>
+        </p:style>
+        <p:txBody>
+          <a:bodyPr rtlCol="0" anchor="ctr"/>
+          <a:lstStyle/>
+          <a:p>
+            <a:pPr algn="ctr"/>
+            <a:endParaRPr lang="fr-FR"/>
+          </a:p>
+        </p:txBody>
+      </p:sp>
+      <p:sp>
+        <p:nvSpPr>
+          <p:cNvPr id="4" name="Ellipse 3">
+            <a:extLst>
+              <a:ext uri="{FF2B5EF4-FFF2-40B4-BE49-F238E27FC236}">
+                <a16:creationId xmlns:a16="http://schemas.microsoft.com/office/drawing/2014/main" id="{38C1E994-A83F-47CE-8E33-41164F74F269}"/>
+              </a:ext>
+            </a:extLst>
+          </p:cNvPr>
+          <p:cNvSpPr/>
+          <p:nvPr/>
+        </p:nvSpPr>
+        <p:spPr>
+          <a:xfrm>
+            <a:off x="5864772" y="3197772"/>
+            <a:ext cx="462455" cy="462455"/>
+          </a:xfrm>
+          <a:prstGeom prst="ellipse">
+            <a:avLst/>
+          </a:prstGeom>
+          <a:gradFill>
+            <a:gsLst>
+              <a:gs pos="0">
+                <a:srgbClr val="DA4E00"/>
+              </a:gs>
+              <a:gs pos="100000">
+                <a:srgbClr val="E97D00"/>
+              </a:gs>
+            </a:gsLst>
+            <a:lin ang="2700000" scaled="0"/>
+          </a:gradFill>
+          <a:ln>
+            <a:noFill/>
+          </a:ln>
+        </p:spPr>
+        <p:style>
+          <a:lnRef idx="2">
+            <a:schemeClr val="accent1">
+              <a:shade val="50000"/>
+            </a:schemeClr>
+          </a:lnRef>
+          <a:fillRef idx="1">
+            <a:schemeClr val="accent1"/>
+          </a:fillRef>
+          <a:effectRef idx="0">
+            <a:schemeClr val="accent1"/>
+          </a:effectRef>
+          <a:fontRef idx="minor">
+            <a:schemeClr val="lt1"/>
+          </a:fontRef>
+        </p:style>
+        <p:txBody>
+          <a:bodyPr rtlCol="0" anchor="ctr"/>
+          <a:lstStyle/>
+          <a:p>
+            <a:pPr algn="ctr"/>
+            <a:endParaRPr lang="fr-FR"/>
+          </a:p>
+        </p:txBody>
+      </p:sp>
+      <p:sp>
+        <p:nvSpPr>
+          <p:cNvPr id="5" name="Cercle : creux 4">
+            <a:extLst>
+              <a:ext uri="{FF2B5EF4-FFF2-40B4-BE49-F238E27FC236}">
+                <a16:creationId xmlns:a16="http://schemas.microsoft.com/office/drawing/2014/main" id="{63E8ABE4-43BC-4C63-8BD4-5469C12950F9}"/>
+              </a:ext>
+            </a:extLst>
+          </p:cNvPr>
+          <p:cNvSpPr/>
+          <p:nvPr/>
+        </p:nvSpPr>
+        <p:spPr>
+          <a:xfrm>
+            <a:off x="4834758" y="2167758"/>
+            <a:ext cx="2522483" cy="2522483"/>
+          </a:xfrm>
+          <a:prstGeom prst="donut">
+            <a:avLst>
+              <a:gd name="adj" fmla="val 7915"/>
+            </a:avLst>
+          </a:prstGeom>
+          <a:gradFill>
+            <a:gsLst>
+              <a:gs pos="8000">
+                <a:srgbClr val="AD1519"/>
+              </a:gs>
+              <a:gs pos="94000">
+                <a:srgbClr val="FABD00"/>
+              </a:gs>
+            </a:gsLst>
+            <a:lin ang="2700000" scaled="0"/>
+          </a:gradFill>
+          <a:ln>
+            <a:noFill/>
+          </a:ln>
+        </p:spPr>
+        <p:style>
+          <a:lnRef idx="2">
+            <a:schemeClr val="accent1">
+              <a:shade val="50000"/>
+            </a:schemeClr>
+          </a:lnRef>
+          <a:fillRef idx="1">
+            <a:schemeClr val="accent1"/>
+          </a:fillRef>
+          <a:effectRef idx="0">
+            <a:schemeClr val="accent1"/>
+          </a:effectRef>
+          <a:fontRef idx="minor">
+            <a:schemeClr val="lt1"/>
+          </a:fontRef>
+        </p:style>
+        <p:txBody>
+          <a:bodyPr rtlCol="0" anchor="ctr"/>
+          <a:lstStyle/>
+          <a:p>
+            <a:pPr algn="ctr"/>
+            <a:endParaRPr lang="fr-FR">
+              <a:solidFill>
+                <a:schemeClr val="tx1"/>
+              </a:solidFill>
+            </a:endParaRPr>
+          </a:p>
+        </p:txBody>
+      </p:sp>
+      <p:sp>
+        <p:nvSpPr>
+          <p:cNvPr id="6" name="Ellipse 5">
+            <a:extLst>
+              <a:ext uri="{FF2B5EF4-FFF2-40B4-BE49-F238E27FC236}">
+                <a16:creationId xmlns:a16="http://schemas.microsoft.com/office/drawing/2014/main" id="{8B8E0B6A-77E0-4B8B-960D-642170E0085B}"/>
+              </a:ext>
+            </a:extLst>
+          </p:cNvPr>
+          <p:cNvSpPr/>
+          <p:nvPr/>
+        </p:nvSpPr>
+        <p:spPr>
+          <a:xfrm>
+            <a:off x="4923177" y="2529446"/>
+            <a:ext cx="462455" cy="462455"/>
+          </a:xfrm>
+          <a:prstGeom prst="ellipse">
+            <a:avLst/>
+          </a:prstGeom>
+          <a:solidFill>
+            <a:srgbClr val="B42517"/>
+          </a:solidFill>
+          <a:ln w="76200">
+            <a:solidFill>
+              <a:schemeClr val="bg1"/>
+            </a:solidFill>
+          </a:ln>
+        </p:spPr>
+        <p:style>
+          <a:lnRef idx="2">
+            <a:schemeClr val="accent1">
+              <a:shade val="50000"/>
+            </a:schemeClr>
+          </a:lnRef>
+          <a:fillRef idx="1">
+            <a:schemeClr val="accent1"/>
+          </a:fillRef>
+          <a:effectRef idx="0">
+            <a:schemeClr val="accent1"/>
+          </a:effectRef>
+          <a:fontRef idx="minor">
+            <a:schemeClr val="lt1"/>
+          </a:fontRef>
+        </p:style>
+        <p:txBody>
+          <a:bodyPr rtlCol="0" anchor="ctr"/>
+          <a:lstStyle/>
+          <a:p>
+            <a:pPr algn="ctr"/>
+            <a:endParaRPr lang="fr-FR"/>
+          </a:p>
+        </p:txBody>
+      </p:sp>
+      <p:sp>
+        <p:nvSpPr>
+          <p:cNvPr id="7" name="Ellipse 6">
+            <a:extLst>
+              <a:ext uri="{FF2B5EF4-FFF2-40B4-BE49-F238E27FC236}">
+                <a16:creationId xmlns:a16="http://schemas.microsoft.com/office/drawing/2014/main" id="{7F802B4C-CAD7-4AF0-A01C-1CF7484A48FA}"/>
+              </a:ext>
+            </a:extLst>
+          </p:cNvPr>
+          <p:cNvSpPr/>
+          <p:nvPr/>
+        </p:nvSpPr>
+        <p:spPr>
+          <a:xfrm>
+            <a:off x="6095999" y="2078421"/>
+            <a:ext cx="462455" cy="462455"/>
+          </a:xfrm>
+          <a:prstGeom prst="ellipse">
+            <a:avLst/>
+          </a:prstGeom>
+          <a:solidFill>
+            <a:srgbClr val="BB3414"/>
+          </a:solidFill>
+          <a:ln w="76200">
+            <a:solidFill>
+              <a:schemeClr val="bg1"/>
+            </a:solidFill>
+          </a:ln>
+        </p:spPr>
+        <p:style>
+          <a:lnRef idx="2">
+            <a:schemeClr val="accent1">
+              <a:shade val="50000"/>
+            </a:schemeClr>
+          </a:lnRef>
+          <a:fillRef idx="1">
+            <a:schemeClr val="accent1"/>
+          </a:fillRef>
+          <a:effectRef idx="0">
+            <a:schemeClr val="accent1"/>
+          </a:effectRef>
+          <a:fontRef idx="minor">
+            <a:schemeClr val="lt1"/>
+          </a:fontRef>
+        </p:style>
+        <p:txBody>
+          <a:bodyPr rtlCol="0" anchor="ctr"/>
+          <a:lstStyle/>
+          <a:p>
+            <a:pPr algn="ctr"/>
+            <a:endParaRPr lang="fr-FR"/>
+          </a:p>
+        </p:txBody>
+      </p:sp>
+    </p:spTree>
+    <p:extLst>
+      <p:ext uri="{BB962C8B-B14F-4D97-AF65-F5344CB8AC3E}">
+        <p14:creationId xmlns:p14="http://schemas.microsoft.com/office/powerpoint/2010/main" val="3746850196"/>
+      </p:ext>
+    </p:extLst>
+  </p:cSld>
+  <p:clrMapOvr>
+    <a:masterClrMapping/>
+  </p:clrMapOvr>
+</p:sld>
+</file>
+
+<file path=ppt/slides/slide6.xml><?xml version="1.0" encoding="utf-8"?>
 <p:sld xmlns:a="http://schemas.openxmlformats.org/drawingml/2006/main" xmlns:r="http://schemas.openxmlformats.org/officeDocument/2006/relationships" xmlns:p="http://schemas.openxmlformats.org/presentationml/2006/main">
   <p:cSld>
     <p:bg>

</xml_diff>